<commit_message>
Update stages image to use better background. Makes text clearer.
</commit_message>
<xml_diff>
--- a/legacy_code/7 stages of naming.pptx
+++ b/legacy_code/7 stages of naming.pptx
@@ -304,7 +304,7 @@
           <a:p>
             <a:fld id="{B63FD611-F30E-F04D-9334-BC7817DAB27C}" type="datetimeFigureOut">
               <a:rPr lang="en-US" smtClean="0"/>
-              <a:t>8/20/2015</a:t>
+              <a:t>8/24/2015</a:t>
             </a:fld>
             <a:endParaRPr lang="en-US"/>
           </a:p>
@@ -474,7 +474,7 @@
           <a:p>
             <a:fld id="{B63FD611-F30E-F04D-9334-BC7817DAB27C}" type="datetimeFigureOut">
               <a:rPr lang="en-US" smtClean="0"/>
-              <a:t>8/20/2015</a:t>
+              <a:t>8/24/2015</a:t>
             </a:fld>
             <a:endParaRPr lang="en-US"/>
           </a:p>
@@ -654,7 +654,7 @@
           <a:p>
             <a:fld id="{B63FD611-F30E-F04D-9334-BC7817DAB27C}" type="datetimeFigureOut">
               <a:rPr lang="en-US" smtClean="0"/>
-              <a:t>8/20/2015</a:t>
+              <a:t>8/24/2015</a:t>
             </a:fld>
             <a:endParaRPr lang="en-US"/>
           </a:p>
@@ -824,7 +824,7 @@
           <a:p>
             <a:fld id="{B63FD611-F30E-F04D-9334-BC7817DAB27C}" type="datetimeFigureOut">
               <a:rPr lang="en-US" smtClean="0"/>
-              <a:t>8/20/2015</a:t>
+              <a:t>8/24/2015</a:t>
             </a:fld>
             <a:endParaRPr lang="en-US"/>
           </a:p>
@@ -1070,7 +1070,7 @@
           <a:p>
             <a:fld id="{B63FD611-F30E-F04D-9334-BC7817DAB27C}" type="datetimeFigureOut">
               <a:rPr lang="en-US" smtClean="0"/>
-              <a:t>8/20/2015</a:t>
+              <a:t>8/24/2015</a:t>
             </a:fld>
             <a:endParaRPr lang="en-US"/>
           </a:p>
@@ -1358,7 +1358,7 @@
           <a:p>
             <a:fld id="{B63FD611-F30E-F04D-9334-BC7817DAB27C}" type="datetimeFigureOut">
               <a:rPr lang="en-US" smtClean="0"/>
-              <a:t>8/20/2015</a:t>
+              <a:t>8/24/2015</a:t>
             </a:fld>
             <a:endParaRPr lang="en-US"/>
           </a:p>
@@ -1780,7 +1780,7 @@
           <a:p>
             <a:fld id="{B63FD611-F30E-F04D-9334-BC7817DAB27C}" type="datetimeFigureOut">
               <a:rPr lang="en-US" smtClean="0"/>
-              <a:t>8/20/2015</a:t>
+              <a:t>8/24/2015</a:t>
             </a:fld>
             <a:endParaRPr lang="en-US"/>
           </a:p>
@@ -1898,7 +1898,7 @@
           <a:p>
             <a:fld id="{B63FD611-F30E-F04D-9334-BC7817DAB27C}" type="datetimeFigureOut">
               <a:rPr lang="en-US" smtClean="0"/>
-              <a:t>8/20/2015</a:t>
+              <a:t>8/24/2015</a:t>
             </a:fld>
             <a:endParaRPr lang="en-US"/>
           </a:p>
@@ -1993,7 +1993,7 @@
           <a:p>
             <a:fld id="{B63FD611-F30E-F04D-9334-BC7817DAB27C}" type="datetimeFigureOut">
               <a:rPr lang="en-US" smtClean="0"/>
-              <a:t>8/20/2015</a:t>
+              <a:t>8/24/2015</a:t>
             </a:fld>
             <a:endParaRPr lang="en-US"/>
           </a:p>
@@ -2270,7 +2270,7 @@
           <a:p>
             <a:fld id="{B63FD611-F30E-F04D-9334-BC7817DAB27C}" type="datetimeFigureOut">
               <a:rPr lang="en-US" smtClean="0"/>
-              <a:t>8/20/2015</a:t>
+              <a:t>8/24/2015</a:t>
             </a:fld>
             <a:endParaRPr lang="en-US"/>
           </a:p>
@@ -2523,7 +2523,7 @@
           <a:p>
             <a:fld id="{B63FD611-F30E-F04D-9334-BC7817DAB27C}" type="datetimeFigureOut">
               <a:rPr lang="en-US" smtClean="0"/>
-              <a:t>8/20/2015</a:t>
+              <a:t>8/24/2015</a:t>
             </a:fld>
             <a:endParaRPr lang="en-US"/>
           </a:p>
@@ -2736,7 +2736,7 @@
           <a:p>
             <a:fld id="{B63FD611-F30E-F04D-9334-BC7817DAB27C}" type="datetimeFigureOut">
               <a:rPr lang="en-US" smtClean="0"/>
-              <a:t>8/20/2015</a:t>
+              <a:t>8/24/2015</a:t>
             </a:fld>
             <a:endParaRPr lang="en-US"/>
           </a:p>
@@ -3135,12 +3135,6 @@
             <a:pPr algn="ctr"/>
             <a:r>
               <a:rPr lang="en-US" dirty="0" smtClean="0">
-                <a:solidFill>
-                  <a:schemeClr val="tx1">
-                    <a:lumMod val="75000"/>
-                    <a:lumOff val="25000"/>
-                  </a:schemeClr>
-                </a:solidFill>
                 <a:latin typeface="Courier"/>
                 <a:cs typeface="Courier"/>
               </a:rPr>
@@ -3151,24 +3145,12 @@
             <a:pPr algn="ctr"/>
             <a:r>
               <a:rPr lang="en-US" dirty="0" smtClean="0">
-                <a:solidFill>
-                  <a:schemeClr val="tx1">
-                    <a:lumMod val="75000"/>
-                    <a:lumOff val="25000"/>
-                  </a:schemeClr>
-                </a:solidFill>
                 <a:latin typeface="Courier"/>
                 <a:cs typeface="Courier"/>
               </a:rPr>
               <a:t>EvilToDatabase()</a:t>
             </a:r>
             <a:endParaRPr lang="en-US" dirty="0">
-              <a:solidFill>
-                <a:schemeClr val="tx1">
-                  <a:lumMod val="75000"/>
-                  <a:lumOff val="25000"/>
-                </a:schemeClr>
-              </a:solidFill>
               <a:latin typeface="Courier"/>
               <a:cs typeface="Courier"/>
             </a:endParaRPr>
@@ -3199,12 +3181,6 @@
             <a:pPr algn="ctr"/>
             <a:r>
               <a:rPr lang="en-US" dirty="0" smtClean="0">
-                <a:solidFill>
-                  <a:schemeClr val="tx1">
-                    <a:lumMod val="75000"/>
-                    <a:lumOff val="25000"/>
-                  </a:schemeClr>
-                </a:solidFill>
                 <a:latin typeface="Courier"/>
                 <a:cs typeface="Courier"/>
               </a:rPr>
@@ -3237,12 +3213,6 @@
             <a:pPr algn="ctr"/>
             <a:r>
               <a:rPr lang="en-US" dirty="0" smtClean="0">
-                <a:solidFill>
-                  <a:schemeClr val="tx1">
-                    <a:lumMod val="75000"/>
-                    <a:lumOff val="25000"/>
-                  </a:schemeClr>
-                </a:solidFill>
                 <a:latin typeface="Courier"/>
                 <a:cs typeface="Courier"/>
               </a:rPr>
@@ -3253,12 +3223,6 @@
             <a:pPr algn="ctr"/>
             <a:r>
               <a:rPr lang="en-US" dirty="0" smtClean="0">
-                <a:solidFill>
-                  <a:schemeClr val="tx1">
-                    <a:lumMod val="75000"/>
-                    <a:lumOff val="25000"/>
-                  </a:schemeClr>
-                </a:solidFill>
                 <a:latin typeface="Courier"/>
                 <a:cs typeface="Courier"/>
               </a:rPr>
@@ -3269,12 +3233,6 @@
             <a:pPr algn="ctr"/>
             <a:r>
               <a:rPr lang="en-US" dirty="0" smtClean="0">
-                <a:solidFill>
-                  <a:schemeClr val="tx1">
-                    <a:lumMod val="75000"/>
-                    <a:lumOff val="25000"/>
-                  </a:schemeClr>
-                </a:solidFill>
                 <a:latin typeface="Courier"/>
                 <a:cs typeface="Courier"/>
               </a:rPr>
@@ -3285,12 +3243,6 @@
             <a:pPr algn="ctr"/>
             <a:r>
               <a:rPr lang="en-US" dirty="0" smtClean="0">
-                <a:solidFill>
-                  <a:schemeClr val="tx1">
-                    <a:lumMod val="75000"/>
-                    <a:lumOff val="25000"/>
-                  </a:schemeClr>
-                </a:solidFill>
                 <a:latin typeface="Courier"/>
                 <a:cs typeface="Courier"/>
               </a:rPr>
@@ -3301,12 +3253,6 @@
             <a:pPr algn="ctr"/>
             <a:r>
               <a:rPr lang="en-US" dirty="0" smtClean="0">
-                <a:solidFill>
-                  <a:schemeClr val="tx1">
-                    <a:lumMod val="75000"/>
-                    <a:lumOff val="25000"/>
-                  </a:schemeClr>
-                </a:solidFill>
                 <a:latin typeface="Courier"/>
                 <a:cs typeface="Courier"/>
               </a:rPr>
@@ -3317,12 +3263,6 @@
             <a:pPr algn="ctr"/>
             <a:r>
               <a:rPr lang="en-US" dirty="0" smtClean="0">
-                <a:solidFill>
-                  <a:schemeClr val="tx1">
-                    <a:lumMod val="75000"/>
-                    <a:lumOff val="25000"/>
-                  </a:schemeClr>
-                </a:solidFill>
                 <a:latin typeface="Courier"/>
                 <a:cs typeface="Courier"/>
               </a:rPr>
@@ -3333,24 +3273,12 @@
             <a:pPr algn="ctr"/>
             <a:r>
               <a:rPr lang="en-US" dirty="0" smtClean="0">
-                <a:solidFill>
-                  <a:schemeClr val="tx1">
-                    <a:lumMod val="75000"/>
-                    <a:lumOff val="25000"/>
-                  </a:schemeClr>
-                </a:solidFill>
                 <a:latin typeface="Courier"/>
                 <a:cs typeface="Courier"/>
               </a:rPr>
               <a:t>Processing()</a:t>
             </a:r>
             <a:endParaRPr lang="en-US" dirty="0">
-              <a:solidFill>
-                <a:schemeClr val="tx1">
-                  <a:lumMod val="75000"/>
-                  <a:lumOff val="25000"/>
-                </a:schemeClr>
-              </a:solidFill>
               <a:latin typeface="Courier"/>
               <a:cs typeface="Courier"/>
             </a:endParaRPr>
@@ -3381,12 +3309,6 @@
             <a:pPr algn="ctr"/>
             <a:r>
               <a:rPr lang="en-US" dirty="0" smtClean="0">
-                <a:solidFill>
-                  <a:schemeClr val="tx1">
-                    <a:lumMod val="75000"/>
-                    <a:lumOff val="25000"/>
-                  </a:schemeClr>
-                </a:solidFill>
                 <a:latin typeface="Courier"/>
                 <a:cs typeface="Courier"/>
               </a:rPr>
@@ -3397,12 +3319,6 @@
             <a:pPr algn="ctr"/>
             <a:r>
               <a:rPr lang="en-US" dirty="0" smtClean="0">
-                <a:solidFill>
-                  <a:schemeClr val="tx1">
-                    <a:lumMod val="75000"/>
-                    <a:lumOff val="25000"/>
-                  </a:schemeClr>
-                </a:solidFill>
                 <a:latin typeface="Courier"/>
                 <a:cs typeface="Courier"/>
               </a:rPr>
@@ -3413,12 +3329,6 @@
             <a:pPr algn="ctr"/>
             <a:r>
               <a:rPr lang="en-US" dirty="0" smtClean="0">
-                <a:solidFill>
-                  <a:schemeClr val="tx1">
-                    <a:lumMod val="75000"/>
-                    <a:lumOff val="25000"/>
-                  </a:schemeClr>
-                </a:solidFill>
                 <a:latin typeface="Courier"/>
                 <a:cs typeface="Courier"/>
               </a:rPr>
@@ -3429,24 +3339,12 @@
             <a:pPr algn="ctr"/>
             <a:r>
               <a:rPr lang="en-US" dirty="0" smtClean="0">
-                <a:solidFill>
-                  <a:schemeClr val="tx1">
-                    <a:lumMod val="75000"/>
-                    <a:lumOff val="25000"/>
-                  </a:schemeClr>
-                </a:solidFill>
                 <a:latin typeface="Courier"/>
                 <a:cs typeface="Courier"/>
               </a:rPr>
               <a:t>StartProcessing()</a:t>
             </a:r>
             <a:endParaRPr lang="en-US" dirty="0">
-              <a:solidFill>
-                <a:schemeClr val="tx1">
-                  <a:lumMod val="75000"/>
-                  <a:lumOff val="25000"/>
-                </a:schemeClr>
-              </a:solidFill>
               <a:latin typeface="Courier"/>
               <a:cs typeface="Courier"/>
             </a:endParaRPr>
@@ -3477,12 +3375,6 @@
             <a:pPr algn="ctr"/>
             <a:r>
               <a:rPr lang="en-US" dirty="0" smtClean="0">
-                <a:solidFill>
-                  <a:schemeClr val="tx1">
-                    <a:lumMod val="75000"/>
-                    <a:lumOff val="25000"/>
-                  </a:schemeClr>
-                </a:solidFill>
                 <a:latin typeface="Courier"/>
                 <a:cs typeface="Courier"/>
               </a:rPr>
@@ -3493,24 +3385,12 @@
             <a:pPr algn="ctr"/>
             <a:r>
               <a:rPr lang="en-US" dirty="0" smtClean="0">
-                <a:solidFill>
-                  <a:schemeClr val="tx1">
-                    <a:lumMod val="75000"/>
-                    <a:lumOff val="25000"/>
-                  </a:schemeClr>
-                </a:solidFill>
                 <a:latin typeface="Courier"/>
                 <a:cs typeface="Courier"/>
               </a:rPr>
               <a:t>Flight()</a:t>
             </a:r>
             <a:endParaRPr lang="en-US" dirty="0">
-              <a:solidFill>
-                <a:schemeClr val="tx1">
-                  <a:lumMod val="75000"/>
-                  <a:lumOff val="25000"/>
-                </a:schemeClr>
-              </a:solidFill>
               <a:latin typeface="Courier"/>
               <a:cs typeface="Courier"/>
             </a:endParaRPr>
@@ -3862,12 +3742,6 @@
             <a:pPr algn="ctr"/>
             <a:r>
               <a:rPr lang="en-US" dirty="0" smtClean="0">
-                <a:solidFill>
-                  <a:schemeClr val="tx1">
-                    <a:lumMod val="75000"/>
-                    <a:lumOff val="25000"/>
-                  </a:schemeClr>
-                </a:solidFill>
                 <a:latin typeface="Courier"/>
                 <a:cs typeface="Courier"/>
               </a:rPr>
@@ -3878,24 +3752,12 @@
             <a:pPr algn="ctr"/>
             <a:r>
               <a:rPr lang="en-US" dirty="0" smtClean="0">
-                <a:solidFill>
-                  <a:schemeClr val="tx1">
-                    <a:lumMod val="75000"/>
-                    <a:lumOff val="25000"/>
-                  </a:schemeClr>
-                </a:solidFill>
                 <a:latin typeface="Courier"/>
                 <a:cs typeface="Courier"/>
               </a:rPr>
               <a:t>.Add(new Flight())</a:t>
             </a:r>
             <a:endParaRPr lang="en-US" dirty="0">
-              <a:solidFill>
-                <a:schemeClr val="tx1">
-                  <a:lumMod val="75000"/>
-                  <a:lumOff val="25000"/>
-                </a:schemeClr>
-              </a:solidFill>
               <a:latin typeface="Courier"/>
               <a:cs typeface="Courier"/>
             </a:endParaRPr>
@@ -3935,33 +3797,7 @@
                 <a:latin typeface="Iowan Old Style Black"/>
                 <a:cs typeface="Iowan Old Style Black"/>
               </a:rPr>
-              <a:t>The </a:t>
-            </a:r>
-            <a:r>
-              <a:rPr lang="en-US" sz="4800" dirty="0" smtClean="0">
-                <a:solidFill>
-                  <a:schemeClr val="tx1">
-                    <a:lumMod val="75000"/>
-                    <a:lumOff val="25000"/>
-                  </a:schemeClr>
-                </a:solidFill>
-                <a:latin typeface="Iowan Old Style Black"/>
-                <a:cs typeface="Iowan Old Style Black"/>
-              </a:rPr>
-              <a:t>7 </a:t>
-            </a:r>
-            <a:r>
-              <a:rPr lang="en-US" sz="4800" dirty="0" smtClean="0">
-                <a:solidFill>
-                  <a:schemeClr val="tx1">
-                    <a:lumMod val="75000"/>
-                    <a:lumOff val="25000"/>
-                  </a:schemeClr>
-                </a:solidFill>
-                <a:latin typeface="Iowan Old Style Black"/>
-                <a:cs typeface="Iowan Old Style Black"/>
-              </a:rPr>
-              <a:t>stages of naming </a:t>
+              <a:t>The 7 stages of naming </a:t>
             </a:r>
             <a:endParaRPr lang="en-US" sz="4800" dirty="0">
               <a:solidFill>
@@ -4000,12 +3836,6 @@
             <a:pPr algn="ctr"/>
             <a:r>
               <a:rPr lang="en-US" sz="1400" dirty="0" smtClean="0">
-                <a:solidFill>
-                  <a:schemeClr val="tx1">
-                    <a:lumMod val="75000"/>
-                    <a:lumOff val="25000"/>
-                  </a:schemeClr>
-                </a:solidFill>
                 <a:latin typeface="Courier"/>
                 <a:cs typeface="Courier"/>
               </a:rPr>
@@ -4016,24 +3846,12 @@
             <a:pPr algn="ctr"/>
             <a:r>
               <a:rPr lang="en-US" sz="1400" dirty="0" smtClean="0">
-                <a:solidFill>
-                  <a:schemeClr val="tx1">
-                    <a:lumMod val="75000"/>
-                    <a:lumOff val="25000"/>
-                  </a:schemeClr>
-                </a:solidFill>
                 <a:latin typeface="Courier"/>
                 <a:cs typeface="Courier"/>
               </a:rPr>
               <a:t>Refactoring Starts</a:t>
             </a:r>
             <a:endParaRPr lang="en-US" sz="1400" dirty="0">
-              <a:solidFill>
-                <a:schemeClr val="tx1">
-                  <a:lumMod val="75000"/>
-                  <a:lumOff val="25000"/>
-                </a:schemeClr>
-              </a:solidFill>
               <a:latin typeface="Courier"/>
               <a:cs typeface="Courier"/>
             </a:endParaRPr>
@@ -4148,13 +3966,8 @@
             <a:pPr algn="ctr"/>
             <a:r>
               <a:rPr lang="en-US" sz="3600" dirty="0" smtClean="0"/>
-              <a:t>         </a:t>
-            </a:r>
-            <a:r>
-              <a:rPr lang="en-US" sz="3600" dirty="0" smtClean="0"/>
-              <a:t>    Nonsense</a:t>
-            </a:r>
-            <a:endParaRPr lang="en-US" sz="3600" dirty="0" smtClean="0"/>
+              <a:t>             Nonsense</a:t>
+            </a:r>
           </a:p>
         </p:txBody>
       </p:sp>
@@ -4168,6 +3981,13 @@
   <p:clrMapOvr>
     <a:masterClrMapping/>
   </p:clrMapOvr>
+  <p:timing>
+    <p:tnLst>
+      <p:par>
+        <p:cTn id="1" dur="indefinite" restart="never" nodeType="tmRoot"/>
+      </p:par>
+    </p:tnLst>
+  </p:timing>
 </p:sld>
 </file>
 

</xml_diff>